<commit_message>
The final version SDS and fix change the highlight of the appointment page
</commit_message>
<xml_diff>
--- a/documents/diagram.pptx
+++ b/documents/diagram.pptx
@@ -219,7 +219,7 @@
           <a:p>
             <a:fld id="{6E54921F-DD3B-43A5-901A-D573FBFBBEC0}" type="datetimeFigureOut">
               <a:rPr lang="en-US" smtClean="0"/>
-              <a:t>4/27/2018</a:t>
+              <a:t>5/13/2018</a:t>
             </a:fld>
             <a:endParaRPr lang="en-US"/>
           </a:p>
@@ -461,7 +461,7 @@
           <a:p>
             <a:fld id="{7AF6CCF6-E8EE-464C-BF2C-15F895051F3B}" type="datetimeFigureOut">
               <a:rPr lang="en-US" smtClean="0"/>
-              <a:t>4/27/2018</a:t>
+              <a:t>5/13/2018</a:t>
             </a:fld>
             <a:endParaRPr lang="en-US"/>
           </a:p>
@@ -659,7 +659,7 @@
           <a:p>
             <a:fld id="{7AF6CCF6-E8EE-464C-BF2C-15F895051F3B}" type="datetimeFigureOut">
               <a:rPr lang="en-US" smtClean="0"/>
-              <a:t>4/27/2018</a:t>
+              <a:t>5/13/2018</a:t>
             </a:fld>
             <a:endParaRPr lang="en-US"/>
           </a:p>
@@ -867,7 +867,7 @@
           <a:p>
             <a:fld id="{7AF6CCF6-E8EE-464C-BF2C-15F895051F3B}" type="datetimeFigureOut">
               <a:rPr lang="en-US" smtClean="0"/>
-              <a:t>4/27/2018</a:t>
+              <a:t>5/13/2018</a:t>
             </a:fld>
             <a:endParaRPr lang="en-US"/>
           </a:p>
@@ -1065,7 +1065,7 @@
           <a:p>
             <a:fld id="{7AF6CCF6-E8EE-464C-BF2C-15F895051F3B}" type="datetimeFigureOut">
               <a:rPr lang="en-US" smtClean="0"/>
-              <a:t>4/27/2018</a:t>
+              <a:t>5/13/2018</a:t>
             </a:fld>
             <a:endParaRPr lang="en-US"/>
           </a:p>
@@ -1340,7 +1340,7 @@
           <a:p>
             <a:fld id="{7AF6CCF6-E8EE-464C-BF2C-15F895051F3B}" type="datetimeFigureOut">
               <a:rPr lang="en-US" smtClean="0"/>
-              <a:t>4/27/2018</a:t>
+              <a:t>5/13/2018</a:t>
             </a:fld>
             <a:endParaRPr lang="en-US"/>
           </a:p>
@@ -1605,7 +1605,7 @@
           <a:p>
             <a:fld id="{7AF6CCF6-E8EE-464C-BF2C-15F895051F3B}" type="datetimeFigureOut">
               <a:rPr lang="en-US" smtClean="0"/>
-              <a:t>4/27/2018</a:t>
+              <a:t>5/13/2018</a:t>
             </a:fld>
             <a:endParaRPr lang="en-US"/>
           </a:p>
@@ -2017,7 +2017,7 @@
           <a:p>
             <a:fld id="{7AF6CCF6-E8EE-464C-BF2C-15F895051F3B}" type="datetimeFigureOut">
               <a:rPr lang="en-US" smtClean="0"/>
-              <a:t>4/27/2018</a:t>
+              <a:t>5/13/2018</a:t>
             </a:fld>
             <a:endParaRPr lang="en-US"/>
           </a:p>
@@ -2158,7 +2158,7 @@
           <a:p>
             <a:fld id="{7AF6CCF6-E8EE-464C-BF2C-15F895051F3B}" type="datetimeFigureOut">
               <a:rPr lang="en-US" smtClean="0"/>
-              <a:t>4/27/2018</a:t>
+              <a:t>5/13/2018</a:t>
             </a:fld>
             <a:endParaRPr lang="en-US"/>
           </a:p>
@@ -2271,7 +2271,7 @@
           <a:p>
             <a:fld id="{7AF6CCF6-E8EE-464C-BF2C-15F895051F3B}" type="datetimeFigureOut">
               <a:rPr lang="en-US" smtClean="0"/>
-              <a:t>4/27/2018</a:t>
+              <a:t>5/13/2018</a:t>
             </a:fld>
             <a:endParaRPr lang="en-US"/>
           </a:p>
@@ -2582,7 +2582,7 @@
           <a:p>
             <a:fld id="{7AF6CCF6-E8EE-464C-BF2C-15F895051F3B}" type="datetimeFigureOut">
               <a:rPr lang="en-US" smtClean="0"/>
-              <a:t>4/27/2018</a:t>
+              <a:t>5/13/2018</a:t>
             </a:fld>
             <a:endParaRPr lang="en-US"/>
           </a:p>
@@ -2870,7 +2870,7 @@
           <a:p>
             <a:fld id="{7AF6CCF6-E8EE-464C-BF2C-15F895051F3B}" type="datetimeFigureOut">
               <a:rPr lang="en-US" smtClean="0"/>
-              <a:t>4/27/2018</a:t>
+              <a:t>5/13/2018</a:t>
             </a:fld>
             <a:endParaRPr lang="en-US"/>
           </a:p>
@@ -3111,7 +3111,7 @@
           <a:p>
             <a:fld id="{7AF6CCF6-E8EE-464C-BF2C-15F895051F3B}" type="datetimeFigureOut">
               <a:rPr lang="en-US" smtClean="0"/>
-              <a:t>4/27/2018</a:t>
+              <a:t>5/13/2018</a:t>
             </a:fld>
             <a:endParaRPr lang="en-US"/>
           </a:p>
@@ -3538,15 +3538,16 @@
             </a:extLst>
           </p:cNvPr>
           <p:cNvCxnSpPr>
+            <a:cxnSpLocks/>
             <a:stCxn id="128" idx="2"/>
-            <a:endCxn id="135" idx="0"/>
+            <a:endCxn id="135" idx="1"/>
           </p:cNvCxnSpPr>
           <p:nvPr/>
         </p:nvCxnSpPr>
         <p:spPr>
           <a:xfrm>
-            <a:off x="4843955" y="5665054"/>
-            <a:ext cx="712631" cy="732365"/>
+            <a:off x="2716988" y="5790631"/>
+            <a:ext cx="713948" cy="461640"/>
           </a:xfrm>
           <a:prstGeom prst="line">
             <a:avLst/>
@@ -3589,8 +3590,8 @@
         </p:nvCxnSpPr>
         <p:spPr>
           <a:xfrm flipH="1">
-            <a:off x="4071774" y="5665054"/>
-            <a:ext cx="772181" cy="703229"/>
+            <a:off x="1601990" y="5790631"/>
+            <a:ext cx="1114998" cy="572429"/>
           </a:xfrm>
           <a:prstGeom prst="line">
             <a:avLst/>
@@ -3718,7 +3719,7 @@
         </p:nvSpPr>
         <p:spPr>
           <a:xfrm>
-            <a:off x="283777" y="1786759"/>
+            <a:off x="254754" y="1813994"/>
             <a:ext cx="1376857" cy="283779"/>
           </a:xfrm>
           <a:prstGeom prst="ellipse">
@@ -3747,13 +3748,18 @@
           <a:p>
             <a:pPr algn="ctr"/>
             <a:r>
-              <a:rPr lang="en-US" sz="1100" u="sng" dirty="0">
+              <a:rPr lang="en-US" sz="1100" u="sng">
                 <a:solidFill>
                   <a:schemeClr val="tx1"/>
                 </a:solidFill>
               </a:rPr>
               <a:t>id</a:t>
             </a:r>
+            <a:endParaRPr lang="en-US" sz="1100" u="sng" dirty="0">
+              <a:solidFill>
+                <a:schemeClr val="tx1"/>
+              </a:solidFill>
+            </a:endParaRPr>
           </a:p>
         </p:txBody>
       </p:sp>
@@ -3771,7 +3777,7 @@
         </p:nvSpPr>
         <p:spPr>
           <a:xfrm>
-            <a:off x="283777" y="2102068"/>
+            <a:off x="254754" y="2129303"/>
             <a:ext cx="1376857" cy="283779"/>
           </a:xfrm>
           <a:prstGeom prst="ellipse">
@@ -3800,13 +3806,18 @@
           <a:p>
             <a:pPr algn="ctr"/>
             <a:r>
-              <a:rPr lang="en-US" sz="1100" dirty="0">
+              <a:rPr lang="en-US" sz="1100">
                 <a:solidFill>
                   <a:schemeClr val="tx1"/>
                 </a:solidFill>
               </a:rPr>
               <a:t>password</a:t>
             </a:r>
+            <a:endParaRPr lang="en-US" sz="1100" dirty="0">
+              <a:solidFill>
+                <a:schemeClr val="tx1"/>
+              </a:solidFill>
+            </a:endParaRPr>
           </a:p>
         </p:txBody>
       </p:sp>
@@ -3824,7 +3835,7 @@
         </p:nvSpPr>
         <p:spPr>
           <a:xfrm>
-            <a:off x="283777" y="2417377"/>
+            <a:off x="254754" y="2444612"/>
             <a:ext cx="1376857" cy="283779"/>
           </a:xfrm>
           <a:prstGeom prst="ellipse">
@@ -3853,7 +3864,7 @@
           <a:p>
             <a:pPr algn="ctr"/>
             <a:r>
-              <a:rPr lang="en-US" sz="1100" dirty="0" err="1">
+              <a:rPr lang="en-US" sz="1100">
                 <a:solidFill>
                   <a:schemeClr val="tx1"/>
                 </a:solidFill>
@@ -3882,7 +3893,7 @@
         </p:nvSpPr>
         <p:spPr>
           <a:xfrm>
-            <a:off x="283777" y="2732686"/>
+            <a:off x="254754" y="2759921"/>
             <a:ext cx="1376857" cy="283779"/>
           </a:xfrm>
           <a:prstGeom prst="ellipse">
@@ -3911,7 +3922,7 @@
           <a:p>
             <a:pPr algn="ctr"/>
             <a:r>
-              <a:rPr lang="en-US" sz="1100" dirty="0" err="1">
+              <a:rPr lang="en-US" sz="1100">
                 <a:solidFill>
                   <a:schemeClr val="tx1"/>
                 </a:solidFill>
@@ -3940,7 +3951,7 @@
         </p:nvSpPr>
         <p:spPr>
           <a:xfrm>
-            <a:off x="283777" y="3047995"/>
+            <a:off x="254754" y="3075230"/>
             <a:ext cx="1376857" cy="283779"/>
           </a:xfrm>
           <a:prstGeom prst="ellipse">
@@ -3969,13 +3980,18 @@
           <a:p>
             <a:pPr algn="ctr"/>
             <a:r>
-              <a:rPr lang="en-US" sz="1100" dirty="0">
+              <a:rPr lang="en-US" sz="1100">
                 <a:solidFill>
                   <a:schemeClr val="tx1"/>
                 </a:solidFill>
               </a:rPr>
               <a:t>username</a:t>
             </a:r>
+            <a:endParaRPr lang="en-US" sz="1100" dirty="0">
+              <a:solidFill>
+                <a:schemeClr val="tx1"/>
+              </a:solidFill>
+            </a:endParaRPr>
           </a:p>
         </p:txBody>
       </p:sp>
@@ -3993,7 +4009,7 @@
         </p:nvSpPr>
         <p:spPr>
           <a:xfrm>
-            <a:off x="283777" y="3363304"/>
+            <a:off x="254754" y="3390539"/>
             <a:ext cx="1376857" cy="283779"/>
           </a:xfrm>
           <a:prstGeom prst="ellipse">
@@ -4022,13 +4038,18 @@
           <a:p>
             <a:pPr algn="ctr"/>
             <a:r>
-              <a:rPr lang="en-US" sz="1100" dirty="0">
+              <a:rPr lang="en-US" sz="1100">
                 <a:solidFill>
                   <a:schemeClr val="tx1"/>
                 </a:solidFill>
               </a:rPr>
               <a:t>email</a:t>
             </a:r>
+            <a:endParaRPr lang="en-US" sz="1100" dirty="0">
+              <a:solidFill>
+                <a:schemeClr val="tx1"/>
+              </a:solidFill>
+            </a:endParaRPr>
           </a:p>
         </p:txBody>
       </p:sp>
@@ -4046,7 +4067,7 @@
         </p:nvSpPr>
         <p:spPr>
           <a:xfrm>
-            <a:off x="283777" y="3678613"/>
+            <a:off x="254754" y="3705848"/>
             <a:ext cx="1376857" cy="283779"/>
           </a:xfrm>
           <a:prstGeom prst="ellipse">
@@ -4075,7 +4096,7 @@
           <a:p>
             <a:pPr algn="ctr"/>
             <a:r>
-              <a:rPr lang="en-US" sz="900" dirty="0" err="1">
+              <a:rPr lang="en-US" sz="900">
                 <a:solidFill>
                   <a:schemeClr val="tx1"/>
                 </a:solidFill>
@@ -4104,7 +4125,7 @@
         </p:nvSpPr>
         <p:spPr>
           <a:xfrm>
-            <a:off x="283777" y="3993922"/>
+            <a:off x="254754" y="4021157"/>
             <a:ext cx="1376857" cy="283779"/>
           </a:xfrm>
           <a:prstGeom prst="ellipse">
@@ -4133,7 +4154,7 @@
           <a:p>
             <a:pPr algn="ctr"/>
             <a:r>
-              <a:rPr lang="en-US" sz="1100" dirty="0" err="1">
+              <a:rPr lang="en-US" sz="1100">
                 <a:solidFill>
                   <a:schemeClr val="tx1"/>
                 </a:solidFill>
@@ -4162,7 +4183,7 @@
         </p:nvSpPr>
         <p:spPr>
           <a:xfrm>
-            <a:off x="283777" y="4309231"/>
+            <a:off x="254754" y="4336466"/>
             <a:ext cx="1376857" cy="283779"/>
           </a:xfrm>
           <a:prstGeom prst="ellipse">
@@ -4191,7 +4212,7 @@
           <a:p>
             <a:pPr algn="ctr"/>
             <a:r>
-              <a:rPr lang="en-US" sz="1100" dirty="0" err="1">
+              <a:rPr lang="en-US" sz="1100">
                 <a:solidFill>
                   <a:schemeClr val="tx1"/>
                 </a:solidFill>
@@ -4220,7 +4241,7 @@
         </p:nvSpPr>
         <p:spPr>
           <a:xfrm>
-            <a:off x="283777" y="4624540"/>
+            <a:off x="254754" y="4651775"/>
             <a:ext cx="1376857" cy="283779"/>
           </a:xfrm>
           <a:prstGeom prst="ellipse">
@@ -4249,7 +4270,7 @@
           <a:p>
             <a:pPr algn="ctr"/>
             <a:r>
-              <a:rPr lang="en-US" sz="1100" dirty="0" err="1">
+              <a:rPr lang="en-US" sz="1100">
                 <a:solidFill>
                   <a:schemeClr val="tx1"/>
                 </a:solidFill>
@@ -4278,7 +4299,7 @@
         </p:nvSpPr>
         <p:spPr>
           <a:xfrm>
-            <a:off x="283777" y="4939849"/>
+            <a:off x="254754" y="4967084"/>
             <a:ext cx="1376857" cy="283779"/>
           </a:xfrm>
           <a:prstGeom prst="ellipse">
@@ -4307,7 +4328,7 @@
           <a:p>
             <a:pPr algn="ctr"/>
             <a:r>
-              <a:rPr lang="en-US" sz="1100" dirty="0" err="1">
+              <a:rPr lang="en-US" sz="1100">
                 <a:solidFill>
                   <a:schemeClr val="tx1"/>
                 </a:solidFill>
@@ -4339,8 +4360,8 @@
         </p:nvCxnSpPr>
         <p:spPr>
           <a:xfrm flipH="1" flipV="1">
-            <a:off x="1660634" y="1928649"/>
-            <a:ext cx="525516" cy="1576544"/>
+            <a:off x="1631611" y="1955884"/>
+            <a:ext cx="554539" cy="1549309"/>
           </a:xfrm>
           <a:prstGeom prst="line">
             <a:avLst/>
@@ -4383,8 +4404,8 @@
         </p:nvCxnSpPr>
         <p:spPr>
           <a:xfrm>
-            <a:off x="1660634" y="2243958"/>
-            <a:ext cx="525516" cy="1261235"/>
+            <a:off x="1631611" y="2271193"/>
+            <a:ext cx="554539" cy="1234000"/>
           </a:xfrm>
           <a:prstGeom prst="line">
             <a:avLst/>
@@ -4427,8 +4448,8 @@
         </p:nvCxnSpPr>
         <p:spPr>
           <a:xfrm>
-            <a:off x="1660634" y="2559267"/>
-            <a:ext cx="525516" cy="945926"/>
+            <a:off x="1631611" y="2586502"/>
+            <a:ext cx="554539" cy="918691"/>
           </a:xfrm>
           <a:prstGeom prst="line">
             <a:avLst/>
@@ -4471,8 +4492,8 @@
         </p:nvCxnSpPr>
         <p:spPr>
           <a:xfrm>
-            <a:off x="1660634" y="2874576"/>
-            <a:ext cx="525516" cy="630617"/>
+            <a:off x="1631611" y="2901811"/>
+            <a:ext cx="554539" cy="603382"/>
           </a:xfrm>
           <a:prstGeom prst="line">
             <a:avLst/>
@@ -4515,8 +4536,8 @@
         </p:nvCxnSpPr>
         <p:spPr>
           <a:xfrm>
-            <a:off x="1660634" y="3189885"/>
-            <a:ext cx="525516" cy="315308"/>
+            <a:off x="1631611" y="3217120"/>
+            <a:ext cx="554539" cy="288073"/>
           </a:xfrm>
           <a:prstGeom prst="line">
             <a:avLst/>
@@ -4559,8 +4580,8 @@
         </p:nvCxnSpPr>
         <p:spPr>
           <a:xfrm flipV="1">
-            <a:off x="1660634" y="3505193"/>
-            <a:ext cx="525516" cy="1"/>
+            <a:off x="1631611" y="3505193"/>
+            <a:ext cx="554539" cy="27236"/>
           </a:xfrm>
           <a:prstGeom prst="line">
             <a:avLst/>
@@ -4603,8 +4624,8 @@
         </p:nvCxnSpPr>
         <p:spPr>
           <a:xfrm flipV="1">
-            <a:off x="1660634" y="3505193"/>
-            <a:ext cx="525516" cy="315310"/>
+            <a:off x="1631611" y="3505193"/>
+            <a:ext cx="554539" cy="342545"/>
           </a:xfrm>
           <a:prstGeom prst="line">
             <a:avLst/>
@@ -4647,8 +4668,8 @@
         </p:nvCxnSpPr>
         <p:spPr>
           <a:xfrm flipV="1">
-            <a:off x="1660634" y="3505193"/>
-            <a:ext cx="525516" cy="630619"/>
+            <a:off x="1631611" y="3505193"/>
+            <a:ext cx="554539" cy="657854"/>
           </a:xfrm>
           <a:prstGeom prst="line">
             <a:avLst/>
@@ -4691,8 +4712,8 @@
         </p:nvCxnSpPr>
         <p:spPr>
           <a:xfrm flipV="1">
-            <a:off x="1660634" y="3505193"/>
-            <a:ext cx="525516" cy="945928"/>
+            <a:off x="1631611" y="3505193"/>
+            <a:ext cx="554539" cy="973163"/>
           </a:xfrm>
           <a:prstGeom prst="line">
             <a:avLst/>
@@ -4735,8 +4756,8 @@
         </p:nvCxnSpPr>
         <p:spPr>
           <a:xfrm flipV="1">
-            <a:off x="1660634" y="3505193"/>
-            <a:ext cx="525516" cy="1261237"/>
+            <a:off x="1631611" y="3505193"/>
+            <a:ext cx="554539" cy="1288472"/>
           </a:xfrm>
           <a:prstGeom prst="line">
             <a:avLst/>
@@ -4779,8 +4800,8 @@
         </p:nvCxnSpPr>
         <p:spPr>
           <a:xfrm flipV="1">
-            <a:off x="1660634" y="3505193"/>
-            <a:ext cx="525516" cy="1576546"/>
+            <a:off x="1631611" y="3505193"/>
+            <a:ext cx="554539" cy="1603781"/>
           </a:xfrm>
           <a:prstGeom prst="line">
             <a:avLst/>
@@ -5029,7 +5050,7 @@
         </p:nvSpPr>
         <p:spPr>
           <a:xfrm>
-            <a:off x="1310402" y="963402"/>
+            <a:off x="788168" y="1040113"/>
             <a:ext cx="1376857" cy="283779"/>
           </a:xfrm>
           <a:prstGeom prst="ellipse">
@@ -5087,7 +5108,7 @@
         </p:nvSpPr>
         <p:spPr>
           <a:xfrm>
-            <a:off x="2151230" y="482250"/>
+            <a:off x="1518744" y="604551"/>
             <a:ext cx="1376857" cy="283779"/>
           </a:xfrm>
           <a:prstGeom prst="ellipse">
@@ -5140,7 +5161,7 @@
         </p:nvSpPr>
         <p:spPr>
           <a:xfrm>
-            <a:off x="2958661" y="976428"/>
+            <a:off x="2937749" y="606013"/>
             <a:ext cx="1376857" cy="283779"/>
           </a:xfrm>
           <a:prstGeom prst="ellipse">
@@ -5195,9 +5216,9 @@
           <p:nvPr/>
         </p:nvCxnSpPr>
         <p:spPr>
-          <a:xfrm flipH="1">
-            <a:off x="2801006" y="766029"/>
-            <a:ext cx="38653" cy="609116"/>
+          <a:xfrm>
+            <a:off x="2207173" y="888330"/>
+            <a:ext cx="593833" cy="486815"/>
           </a:xfrm>
           <a:prstGeom prst="line">
             <a:avLst/>
@@ -5240,8 +5261,8 @@
         </p:nvCxnSpPr>
         <p:spPr>
           <a:xfrm flipV="1">
-            <a:off x="2801006" y="1260207"/>
-            <a:ext cx="846084" cy="114938"/>
+            <a:off x="2801006" y="889792"/>
+            <a:ext cx="825172" cy="485353"/>
           </a:xfrm>
           <a:prstGeom prst="line">
             <a:avLst/>
@@ -5284,8 +5305,8 @@
         </p:nvCxnSpPr>
         <p:spPr>
           <a:xfrm flipH="1" flipV="1">
-            <a:off x="1998831" y="1247181"/>
-            <a:ext cx="802175" cy="127964"/>
+            <a:off x="1476597" y="1323892"/>
+            <a:ext cx="1324409" cy="51253"/>
           </a:xfrm>
           <a:prstGeom prst="line">
             <a:avLst/>
@@ -5325,7 +5346,7 @@
         </p:nvSpPr>
         <p:spPr>
           <a:xfrm>
-            <a:off x="2186150" y="5192089"/>
+            <a:off x="4615088" y="2712029"/>
             <a:ext cx="1802523" cy="472965"/>
           </a:xfrm>
           <a:prstGeom prst="rect">
@@ -5383,8 +5404,8 @@
         </p:nvSpPr>
         <p:spPr>
           <a:xfrm>
-            <a:off x="394467" y="6280757"/>
-            <a:ext cx="1376857" cy="283779"/>
+            <a:off x="4212334" y="3520744"/>
+            <a:ext cx="1402354" cy="371805"/>
           </a:xfrm>
           <a:prstGeom prst="ellipse">
             <a:avLst/>
@@ -5436,7 +5457,7 @@
         </p:nvSpPr>
         <p:spPr>
           <a:xfrm>
-            <a:off x="1859346" y="6271072"/>
+            <a:off x="5478241" y="3860860"/>
             <a:ext cx="1376857" cy="283779"/>
           </a:xfrm>
           <a:prstGeom prst="ellipse">
@@ -5485,15 +5506,16 @@
             </a:extLst>
           </p:cNvPr>
           <p:cNvCxnSpPr>
-            <a:stCxn id="89" idx="0"/>
+            <a:cxnSpLocks/>
+            <a:stCxn id="89" idx="7"/>
             <a:endCxn id="87" idx="2"/>
           </p:cNvCxnSpPr>
           <p:nvPr/>
         </p:nvCxnSpPr>
         <p:spPr>
           <a:xfrm flipV="1">
-            <a:off x="1082896" y="5665054"/>
-            <a:ext cx="2004516" cy="615703"/>
+            <a:off x="5409318" y="3184994"/>
+            <a:ext cx="107032" cy="390200"/>
           </a:xfrm>
           <a:prstGeom prst="line">
             <a:avLst/>
@@ -5535,9 +5557,9 @@
           <p:nvPr/>
         </p:nvCxnSpPr>
         <p:spPr>
-          <a:xfrm flipH="1">
-            <a:off x="2547775" y="5665054"/>
-            <a:ext cx="539637" cy="606018"/>
+          <a:xfrm>
+            <a:off x="5516350" y="3184994"/>
+            <a:ext cx="650320" cy="675866"/>
           </a:xfrm>
           <a:prstGeom prst="line">
             <a:avLst/>
@@ -5577,7 +5599,7 @@
         </p:nvSpPr>
         <p:spPr>
           <a:xfrm>
-            <a:off x="2325410" y="4172779"/>
+            <a:off x="4754348" y="1692719"/>
             <a:ext cx="1524002" cy="556681"/>
           </a:xfrm>
           <a:prstGeom prst="diamond">
@@ -5626,15 +5648,16 @@
             </a:extLst>
           </p:cNvPr>
           <p:cNvCxnSpPr>
-            <a:stCxn id="6" idx="2"/>
-            <a:endCxn id="100" idx="0"/>
+            <a:cxnSpLocks/>
+            <a:stCxn id="6" idx="3"/>
+            <a:endCxn id="100" idx="1"/>
           </p:cNvCxnSpPr>
           <p:nvPr/>
         </p:nvCxnSpPr>
         <p:spPr>
-          <a:xfrm>
-            <a:off x="2801005" y="3741675"/>
-            <a:ext cx="286406" cy="431104"/>
+          <a:xfrm flipV="1">
+            <a:off x="3415860" y="1971060"/>
+            <a:ext cx="1338488" cy="1534133"/>
           </a:xfrm>
           <a:prstGeom prst="line">
             <a:avLst/>
@@ -5677,7 +5700,7 @@
         </p:nvCxnSpPr>
         <p:spPr>
           <a:xfrm>
-            <a:off x="3087411" y="4729460"/>
+            <a:off x="5516349" y="2249400"/>
             <a:ext cx="1" cy="462629"/>
           </a:xfrm>
           <a:prstGeom prst="line">
@@ -5718,7 +5741,7 @@
         </p:nvSpPr>
         <p:spPr>
           <a:xfrm>
-            <a:off x="2547775" y="3875737"/>
+            <a:off x="3719602" y="2766701"/>
             <a:ext cx="269626" cy="276999"/>
           </a:xfrm>
           <a:prstGeom prst="rect">
@@ -5753,7 +5776,7 @@
         </p:nvSpPr>
         <p:spPr>
           <a:xfrm>
-            <a:off x="2704845" y="4790941"/>
+            <a:off x="5133783" y="2310881"/>
             <a:ext cx="269626" cy="276999"/>
           </a:xfrm>
           <a:prstGeom prst="rect">
@@ -5788,7 +5811,7 @@
         </p:nvSpPr>
         <p:spPr>
           <a:xfrm>
-            <a:off x="5880539" y="4172779"/>
+            <a:off x="5196901" y="4430925"/>
             <a:ext cx="1524002" cy="556681"/>
           </a:xfrm>
           <a:prstGeom prst="diamond">
@@ -5847,7 +5870,7 @@
         </p:nvSpPr>
         <p:spPr>
           <a:xfrm>
-            <a:off x="5741278" y="5192089"/>
+            <a:off x="5057640" y="5450235"/>
             <a:ext cx="1802523" cy="472965"/>
           </a:xfrm>
           <a:prstGeom prst="rect">
@@ -5901,6 +5924,7 @@
             </a:extLst>
           </p:cNvPr>
           <p:cNvCxnSpPr>
+            <a:cxnSpLocks/>
             <a:stCxn id="6" idx="2"/>
             <a:endCxn id="109" idx="0"/>
           </p:cNvCxnSpPr>
@@ -5909,7 +5933,7 @@
         <p:spPr>
           <a:xfrm>
             <a:off x="2801005" y="3741675"/>
-            <a:ext cx="3841535" cy="431104"/>
+            <a:ext cx="3157897" cy="689250"/>
           </a:xfrm>
           <a:prstGeom prst="line">
             <a:avLst/>
@@ -5952,7 +5976,7 @@
         </p:nvCxnSpPr>
         <p:spPr>
           <a:xfrm>
-            <a:off x="6642540" y="4729460"/>
+            <a:off x="5958902" y="4987606"/>
             <a:ext cx="0" cy="462629"/>
           </a:xfrm>
           <a:prstGeom prst="line">
@@ -5993,8 +6017,8 @@
         </p:nvSpPr>
         <p:spPr>
           <a:xfrm>
-            <a:off x="4543653" y="1903141"/>
-            <a:ext cx="2025863" cy="472965"/>
+            <a:off x="7895666" y="2331144"/>
+            <a:ext cx="2025863" cy="556681"/>
           </a:xfrm>
           <a:prstGeom prst="rect">
             <a:avLst/>
@@ -6051,7 +6075,7 @@
         </p:nvSpPr>
         <p:spPr>
           <a:xfrm>
-            <a:off x="3988672" y="4172779"/>
+            <a:off x="1861705" y="4298356"/>
             <a:ext cx="1524002" cy="556681"/>
           </a:xfrm>
           <a:prstGeom prst="diamond">
@@ -6109,7 +6133,7 @@
         </p:nvSpPr>
         <p:spPr>
           <a:xfrm>
-            <a:off x="4155526" y="5192089"/>
+            <a:off x="2028559" y="5317666"/>
             <a:ext cx="1376858" cy="472965"/>
           </a:xfrm>
           <a:prstGeom prst="rect">
@@ -6162,8 +6186,8 @@
         </p:nvSpPr>
         <p:spPr>
           <a:xfrm>
-            <a:off x="3383345" y="5966315"/>
-            <a:ext cx="1376857" cy="283779"/>
+            <a:off x="627499" y="5905941"/>
+            <a:ext cx="1401060" cy="333982"/>
           </a:xfrm>
           <a:prstGeom prst="ellipse">
             <a:avLst/>
@@ -6196,7 +6220,7 @@
                   <a:schemeClr val="tx1"/>
                 </a:solidFill>
               </a:rPr>
-              <a:t>User.id</a:t>
+              <a:t>Membercard.id</a:t>
             </a:r>
           </a:p>
         </p:txBody>
@@ -6215,7 +6239,7 @@
         </p:nvSpPr>
         <p:spPr>
           <a:xfrm>
-            <a:off x="4868157" y="5955762"/>
+            <a:off x="3352800" y="5812962"/>
             <a:ext cx="1376857" cy="283779"/>
           </a:xfrm>
           <a:prstGeom prst="ellipse">
@@ -6268,7 +6292,7 @@
         </p:nvSpPr>
         <p:spPr>
           <a:xfrm>
-            <a:off x="4868157" y="6397419"/>
+            <a:off x="3229300" y="6210713"/>
             <a:ext cx="1376857" cy="283779"/>
           </a:xfrm>
           <a:prstGeom prst="ellipse">
@@ -6321,7 +6345,7 @@
         </p:nvSpPr>
         <p:spPr>
           <a:xfrm>
-            <a:off x="3383345" y="6368283"/>
+            <a:off x="913561" y="6363060"/>
             <a:ext cx="1376857" cy="283779"/>
           </a:xfrm>
           <a:prstGeom prst="ellipse">
@@ -6370,15 +6394,16 @@
             </a:extLst>
           </p:cNvPr>
           <p:cNvCxnSpPr>
+            <a:cxnSpLocks/>
             <a:stCxn id="128" idx="2"/>
-            <a:endCxn id="131" idx="0"/>
+            <a:endCxn id="131" idx="7"/>
           </p:cNvCxnSpPr>
           <p:nvPr/>
         </p:nvCxnSpPr>
         <p:spPr>
           <a:xfrm flipH="1">
-            <a:off x="4071774" y="5665054"/>
-            <a:ext cx="772181" cy="301261"/>
+            <a:off x="1823379" y="5790631"/>
+            <a:ext cx="893609" cy="164221"/>
           </a:xfrm>
           <a:prstGeom prst="line">
             <a:avLst/>
@@ -6414,15 +6439,16 @@
             </a:extLst>
           </p:cNvPr>
           <p:cNvCxnSpPr>
+            <a:cxnSpLocks/>
             <a:stCxn id="128" idx="2"/>
-            <a:endCxn id="134" idx="0"/>
+            <a:endCxn id="134" idx="1"/>
           </p:cNvCxnSpPr>
           <p:nvPr/>
         </p:nvCxnSpPr>
         <p:spPr>
           <a:xfrm>
-            <a:off x="4843955" y="5665054"/>
-            <a:ext cx="712631" cy="290708"/>
+            <a:off x="2716988" y="5790631"/>
+            <a:ext cx="837448" cy="63889"/>
           </a:xfrm>
           <a:prstGeom prst="line">
             <a:avLst/>
@@ -6464,9 +6490,9 @@
           <p:nvPr/>
         </p:nvCxnSpPr>
         <p:spPr>
-          <a:xfrm>
-            <a:off x="2801005" y="3741675"/>
-            <a:ext cx="1949668" cy="431104"/>
+          <a:xfrm flipH="1">
+            <a:off x="2623706" y="3741675"/>
+            <a:ext cx="177299" cy="556681"/>
           </a:xfrm>
           <a:prstGeom prst="line">
             <a:avLst/>
@@ -6509,7 +6535,7 @@
         </p:nvCxnSpPr>
         <p:spPr>
           <a:xfrm>
-            <a:off x="4750673" y="4729460"/>
+            <a:off x="2623706" y="4855037"/>
             <a:ext cx="93282" cy="462629"/>
           </a:xfrm>
           <a:prstGeom prst="line">
@@ -6550,7 +6576,7 @@
         </p:nvSpPr>
         <p:spPr>
           <a:xfrm>
-            <a:off x="4467779" y="2780415"/>
+            <a:off x="7676429" y="1414378"/>
             <a:ext cx="1524002" cy="556681"/>
           </a:xfrm>
           <a:prstGeom prst="diamond">
@@ -6603,8 +6629,8 @@
         </p:nvSpPr>
         <p:spPr>
           <a:xfrm>
-            <a:off x="4500294" y="851705"/>
-            <a:ext cx="1376857" cy="283779"/>
+            <a:off x="8782973" y="3444506"/>
+            <a:ext cx="1532602" cy="298369"/>
           </a:xfrm>
           <a:prstGeom prst="ellipse">
             <a:avLst/>
@@ -6632,12 +6658,12 @@
           <a:p>
             <a:pPr algn="ctr"/>
             <a:r>
-              <a:rPr lang="en-US" sz="1100" dirty="0">
+              <a:rPr lang="en-US" altLang="zh-CN" sz="1100" dirty="0">
                 <a:solidFill>
                   <a:schemeClr val="tx1"/>
                 </a:solidFill>
               </a:rPr>
-              <a:t>User.id</a:t>
+              <a:t>Membercard.id</a:t>
             </a:r>
           </a:p>
         </p:txBody>
@@ -6656,7 +6682,7 @@
         </p:nvSpPr>
         <p:spPr>
           <a:xfrm>
-            <a:off x="5979402" y="829638"/>
+            <a:off x="9200431" y="3044305"/>
             <a:ext cx="1376857" cy="283779"/>
           </a:xfrm>
           <a:prstGeom prst="ellipse">
@@ -6705,15 +6731,16 @@
             </a:extLst>
           </p:cNvPr>
           <p:cNvCxnSpPr>
-            <a:stCxn id="120" idx="0"/>
-            <a:endCxn id="154" idx="4"/>
+            <a:cxnSpLocks/>
+            <a:stCxn id="120" idx="2"/>
+            <a:endCxn id="154" idx="0"/>
           </p:cNvCxnSpPr>
           <p:nvPr/>
         </p:nvCxnSpPr>
         <p:spPr>
-          <a:xfrm flipH="1" flipV="1">
-            <a:off x="5188723" y="1135484"/>
-            <a:ext cx="367862" cy="767657"/>
+          <a:xfrm>
+            <a:off x="8908598" y="2887825"/>
+            <a:ext cx="640676" cy="556681"/>
           </a:xfrm>
           <a:prstGeom prst="line">
             <a:avLst/>
@@ -6749,15 +6776,16 @@
             </a:extLst>
           </p:cNvPr>
           <p:cNvCxnSpPr>
-            <a:stCxn id="120" idx="0"/>
-            <a:endCxn id="155" idx="4"/>
+            <a:cxnSpLocks/>
+            <a:stCxn id="120" idx="2"/>
+            <a:endCxn id="155" idx="0"/>
           </p:cNvCxnSpPr>
           <p:nvPr/>
         </p:nvCxnSpPr>
         <p:spPr>
-          <a:xfrm flipV="1">
-            <a:off x="5556585" y="1113417"/>
-            <a:ext cx="1111246" cy="789724"/>
+          <a:xfrm>
+            <a:off x="8908598" y="2887825"/>
+            <a:ext cx="980262" cy="156480"/>
           </a:xfrm>
           <a:prstGeom prst="line">
             <a:avLst/>
@@ -6793,15 +6821,16 @@
             </a:extLst>
           </p:cNvPr>
           <p:cNvCxnSpPr>
-            <a:stCxn id="120" idx="2"/>
-            <a:endCxn id="151" idx="0"/>
+            <a:cxnSpLocks/>
+            <a:stCxn id="120" idx="0"/>
+            <a:endCxn id="151" idx="2"/>
           </p:cNvCxnSpPr>
           <p:nvPr/>
         </p:nvCxnSpPr>
         <p:spPr>
-          <a:xfrm flipH="1">
-            <a:off x="5229780" y="2376106"/>
-            <a:ext cx="326805" cy="404309"/>
+          <a:xfrm flipH="1" flipV="1">
+            <a:off x="8438430" y="1971059"/>
+            <a:ext cx="470168" cy="360085"/>
           </a:xfrm>
           <a:prstGeom prst="line">
             <a:avLst/>
@@ -6829,42 +6858,595 @@
       </p:cxnSp>
       <p:cxnSp>
         <p:nvCxnSpPr>
-          <p:cNvPr id="163" name="Straight Connector 162">
-            <a:extLst>
-              <a:ext uri="{FF2B5EF4-FFF2-40B4-BE49-F238E27FC236}">
-                <a16:creationId xmlns:a16="http://schemas.microsoft.com/office/drawing/2014/main" id="{892E94D7-6AAA-40F9-8726-7827329BDC75}"/>
+          <p:cNvPr id="66" name="直接连接符 65">
+            <a:extLst>
+              <a:ext uri="{FF2B5EF4-FFF2-40B4-BE49-F238E27FC236}">
+                <a16:creationId xmlns:a16="http://schemas.microsoft.com/office/drawing/2014/main" id="{12A919FD-DDBE-422F-BD85-BC11358E4B0D}"/>
               </a:ext>
             </a:extLst>
           </p:cNvPr>
           <p:cNvCxnSpPr>
-            <a:stCxn id="6" idx="3"/>
-            <a:endCxn id="151" idx="2"/>
+            <a:cxnSpLocks/>
+            <a:stCxn id="151" idx="1"/>
+            <a:endCxn id="87" idx="3"/>
           </p:cNvCxnSpPr>
           <p:nvPr/>
         </p:nvCxnSpPr>
         <p:spPr>
-          <a:xfrm flipV="1">
-            <a:off x="3415860" y="3337096"/>
-            <a:ext cx="1813920" cy="168097"/>
+          <a:xfrm flipH="1">
+            <a:off x="6417611" y="1692719"/>
+            <a:ext cx="1258818" cy="1255793"/>
           </a:xfrm>
           <a:prstGeom prst="line">
             <a:avLst/>
           </a:prstGeom>
-          <a:ln>
-            <a:solidFill>
-              <a:schemeClr val="tx1"/>
-            </a:solidFill>
-          </a:ln>
         </p:spPr>
         <p:style>
           <a:lnRef idx="1">
-            <a:schemeClr val="accent1"/>
+            <a:schemeClr val="accent5"/>
           </a:lnRef>
           <a:fillRef idx="0">
-            <a:schemeClr val="accent1"/>
-          </a:fillRef>
-          <a:effectRef idx="0">
-            <a:schemeClr val="accent1"/>
+            <a:schemeClr val="accent5"/>
+          </a:fillRef>
+          <a:effectRef idx="0">
+            <a:schemeClr val="accent5"/>
+          </a:effectRef>
+          <a:fontRef idx="minor">
+            <a:schemeClr val="tx1"/>
+          </a:fontRef>
+        </p:style>
+      </p:cxnSp>
+      <p:sp>
+        <p:nvSpPr>
+          <p:cNvPr id="107" name="Oval 89">
+            <a:extLst>
+              <a:ext uri="{FF2B5EF4-FFF2-40B4-BE49-F238E27FC236}">
+                <a16:creationId xmlns:a16="http://schemas.microsoft.com/office/drawing/2014/main" id="{A0559BFD-0F9D-473A-BDE0-FB0829B80CB3}"/>
+              </a:ext>
+            </a:extLst>
+          </p:cNvPr>
+          <p:cNvSpPr/>
+          <p:nvPr/>
+        </p:nvSpPr>
+        <p:spPr>
+          <a:xfrm>
+            <a:off x="5958902" y="3482471"/>
+            <a:ext cx="1376857" cy="283779"/>
+          </a:xfrm>
+          <a:prstGeom prst="ellipse">
+            <a:avLst/>
+          </a:prstGeom>
+        </p:spPr>
+        <p:style>
+          <a:lnRef idx="2">
+            <a:schemeClr val="accent1">
+              <a:shade val="50000"/>
+            </a:schemeClr>
+          </a:lnRef>
+          <a:fillRef idx="1">
+            <a:schemeClr val="accent1"/>
+          </a:fillRef>
+          <a:effectRef idx="0">
+            <a:schemeClr val="accent1"/>
+          </a:effectRef>
+          <a:fontRef idx="minor">
+            <a:schemeClr val="lt1"/>
+          </a:fontRef>
+        </p:style>
+        <p:txBody>
+          <a:bodyPr rtlCol="0" anchor="ctr"/>
+          <a:lstStyle/>
+          <a:p>
+            <a:pPr algn="ctr"/>
+            <a:r>
+              <a:rPr lang="en-US" sz="1100" u="sng" dirty="0">
+                <a:solidFill>
+                  <a:schemeClr val="tx1"/>
+                </a:solidFill>
+              </a:rPr>
+              <a:t>id</a:t>
+            </a:r>
+          </a:p>
+        </p:txBody>
+      </p:sp>
+      <p:sp>
+        <p:nvSpPr>
+          <p:cNvPr id="108" name="Oval 89">
+            <a:extLst>
+              <a:ext uri="{FF2B5EF4-FFF2-40B4-BE49-F238E27FC236}">
+                <a16:creationId xmlns:a16="http://schemas.microsoft.com/office/drawing/2014/main" id="{146C30FE-D1BB-412A-8AB9-7BDCAC087DD1}"/>
+              </a:ext>
+            </a:extLst>
+          </p:cNvPr>
+          <p:cNvSpPr/>
+          <p:nvPr/>
+        </p:nvSpPr>
+        <p:spPr>
+          <a:xfrm>
+            <a:off x="2290418" y="6504949"/>
+            <a:ext cx="1376857" cy="283779"/>
+          </a:xfrm>
+          <a:prstGeom prst="ellipse">
+            <a:avLst/>
+          </a:prstGeom>
+        </p:spPr>
+        <p:style>
+          <a:lnRef idx="2">
+            <a:schemeClr val="accent1">
+              <a:shade val="50000"/>
+            </a:schemeClr>
+          </a:lnRef>
+          <a:fillRef idx="1">
+            <a:schemeClr val="accent1"/>
+          </a:fillRef>
+          <a:effectRef idx="0">
+            <a:schemeClr val="accent1"/>
+          </a:effectRef>
+          <a:fontRef idx="minor">
+            <a:schemeClr val="lt1"/>
+          </a:fontRef>
+        </p:style>
+        <p:txBody>
+          <a:bodyPr rtlCol="0" anchor="ctr"/>
+          <a:lstStyle/>
+          <a:p>
+            <a:pPr algn="ctr"/>
+            <a:r>
+              <a:rPr lang="en-US" sz="1100" u="sng" dirty="0">
+                <a:solidFill>
+                  <a:schemeClr val="tx1"/>
+                </a:solidFill>
+              </a:rPr>
+              <a:t>id</a:t>
+            </a:r>
+          </a:p>
+        </p:txBody>
+      </p:sp>
+      <p:sp>
+        <p:nvSpPr>
+          <p:cNvPr id="110" name="Oval 89">
+            <a:extLst>
+              <a:ext uri="{FF2B5EF4-FFF2-40B4-BE49-F238E27FC236}">
+                <a16:creationId xmlns:a16="http://schemas.microsoft.com/office/drawing/2014/main" id="{FBE0EDDA-D23D-409A-ABE3-DA544E1CF253}"/>
+              </a:ext>
+            </a:extLst>
+          </p:cNvPr>
+          <p:cNvSpPr/>
+          <p:nvPr/>
+        </p:nvSpPr>
+        <p:spPr>
+          <a:xfrm>
+            <a:off x="7985085" y="3846018"/>
+            <a:ext cx="1376857" cy="291674"/>
+          </a:xfrm>
+          <a:prstGeom prst="ellipse">
+            <a:avLst/>
+          </a:prstGeom>
+        </p:spPr>
+        <p:style>
+          <a:lnRef idx="2">
+            <a:schemeClr val="accent1">
+              <a:shade val="50000"/>
+            </a:schemeClr>
+          </a:lnRef>
+          <a:fillRef idx="1">
+            <a:schemeClr val="accent1"/>
+          </a:fillRef>
+          <a:effectRef idx="0">
+            <a:schemeClr val="accent1"/>
+          </a:effectRef>
+          <a:fontRef idx="minor">
+            <a:schemeClr val="lt1"/>
+          </a:fontRef>
+        </p:style>
+        <p:txBody>
+          <a:bodyPr rtlCol="0" anchor="ctr"/>
+          <a:lstStyle/>
+          <a:p>
+            <a:pPr algn="ctr"/>
+            <a:r>
+              <a:rPr lang="en-US" sz="1100" u="sng" dirty="0">
+                <a:solidFill>
+                  <a:schemeClr val="tx1"/>
+                </a:solidFill>
+              </a:rPr>
+              <a:t>id</a:t>
+            </a:r>
+            <a:endParaRPr lang="en-US" u="sng" dirty="0">
+              <a:solidFill>
+                <a:schemeClr val="tx1"/>
+              </a:solidFill>
+            </a:endParaRPr>
+          </a:p>
+        </p:txBody>
+      </p:sp>
+      <p:cxnSp>
+        <p:nvCxnSpPr>
+          <p:cNvPr id="71" name="直接连接符 70">
+            <a:extLst>
+              <a:ext uri="{FF2B5EF4-FFF2-40B4-BE49-F238E27FC236}">
+                <a16:creationId xmlns:a16="http://schemas.microsoft.com/office/drawing/2014/main" id="{1CDDE66F-58C6-46A4-9584-FDC2E49B8F53}"/>
+              </a:ext>
+            </a:extLst>
+          </p:cNvPr>
+          <p:cNvCxnSpPr>
+            <a:stCxn id="120" idx="2"/>
+            <a:endCxn id="110" idx="0"/>
+          </p:cNvCxnSpPr>
+          <p:nvPr/>
+        </p:nvCxnSpPr>
+        <p:spPr>
+          <a:xfrm flipH="1">
+            <a:off x="8673514" y="2887825"/>
+            <a:ext cx="235084" cy="958193"/>
+          </a:xfrm>
+          <a:prstGeom prst="line">
+            <a:avLst/>
+          </a:prstGeom>
+        </p:spPr>
+        <p:style>
+          <a:lnRef idx="1">
+            <a:schemeClr val="accent4"/>
+          </a:lnRef>
+          <a:fillRef idx="0">
+            <a:schemeClr val="accent4"/>
+          </a:fillRef>
+          <a:effectRef idx="0">
+            <a:schemeClr val="accent4"/>
+          </a:effectRef>
+          <a:fontRef idx="minor">
+            <a:schemeClr val="tx1"/>
+          </a:fontRef>
+        </p:style>
+      </p:cxnSp>
+      <p:cxnSp>
+        <p:nvCxnSpPr>
+          <p:cNvPr id="74" name="直接连接符 73">
+            <a:extLst>
+              <a:ext uri="{FF2B5EF4-FFF2-40B4-BE49-F238E27FC236}">
+                <a16:creationId xmlns:a16="http://schemas.microsoft.com/office/drawing/2014/main" id="{01F32658-E241-4B17-8E83-4764BE2062F0}"/>
+              </a:ext>
+            </a:extLst>
+          </p:cNvPr>
+          <p:cNvCxnSpPr>
+            <a:stCxn id="107" idx="0"/>
+            <a:endCxn id="87" idx="2"/>
+          </p:cNvCxnSpPr>
+          <p:nvPr/>
+        </p:nvCxnSpPr>
+        <p:spPr>
+          <a:xfrm flipH="1" flipV="1">
+            <a:off x="5516350" y="3184994"/>
+            <a:ext cx="1130981" cy="297477"/>
+          </a:xfrm>
+          <a:prstGeom prst="line">
+            <a:avLst/>
+          </a:prstGeom>
+        </p:spPr>
+        <p:style>
+          <a:lnRef idx="1">
+            <a:schemeClr val="accent4"/>
+          </a:lnRef>
+          <a:fillRef idx="0">
+            <a:schemeClr val="accent4"/>
+          </a:fillRef>
+          <a:effectRef idx="0">
+            <a:schemeClr val="accent4"/>
+          </a:effectRef>
+          <a:fontRef idx="minor">
+            <a:schemeClr val="tx1"/>
+          </a:fontRef>
+        </p:style>
+      </p:cxnSp>
+      <p:cxnSp>
+        <p:nvCxnSpPr>
+          <p:cNvPr id="77" name="直接连接符 76">
+            <a:extLst>
+              <a:ext uri="{FF2B5EF4-FFF2-40B4-BE49-F238E27FC236}">
+                <a16:creationId xmlns:a16="http://schemas.microsoft.com/office/drawing/2014/main" id="{B4C377F1-C670-438D-9753-C3193BD9B76C}"/>
+              </a:ext>
+            </a:extLst>
+          </p:cNvPr>
+          <p:cNvCxnSpPr>
+            <a:stCxn id="108" idx="0"/>
+            <a:endCxn id="128" idx="2"/>
+          </p:cNvCxnSpPr>
+          <p:nvPr/>
+        </p:nvCxnSpPr>
+        <p:spPr>
+          <a:xfrm flipH="1" flipV="1">
+            <a:off x="2716988" y="5790631"/>
+            <a:ext cx="261859" cy="714318"/>
+          </a:xfrm>
+          <a:prstGeom prst="line">
+            <a:avLst/>
+          </a:prstGeom>
+        </p:spPr>
+        <p:style>
+          <a:lnRef idx="1">
+            <a:schemeClr val="accent5"/>
+          </a:lnRef>
+          <a:fillRef idx="0">
+            <a:schemeClr val="accent5"/>
+          </a:fillRef>
+          <a:effectRef idx="0">
+            <a:schemeClr val="accent5"/>
+          </a:effectRef>
+          <a:fontRef idx="minor">
+            <a:schemeClr val="tx1"/>
+          </a:fontRef>
+        </p:style>
+      </p:cxnSp>
+      <p:sp>
+        <p:nvSpPr>
+          <p:cNvPr id="116" name="Oval 89">
+            <a:extLst>
+              <a:ext uri="{FF2B5EF4-FFF2-40B4-BE49-F238E27FC236}">
+                <a16:creationId xmlns:a16="http://schemas.microsoft.com/office/drawing/2014/main" id="{A0C91098-B4FC-4BD3-8BD5-846A048BA5F2}"/>
+              </a:ext>
+            </a:extLst>
+          </p:cNvPr>
+          <p:cNvSpPr/>
+          <p:nvPr/>
+        </p:nvSpPr>
+        <p:spPr>
+          <a:xfrm>
+            <a:off x="3489435" y="1114085"/>
+            <a:ext cx="1376857" cy="283779"/>
+          </a:xfrm>
+          <a:prstGeom prst="ellipse">
+            <a:avLst/>
+          </a:prstGeom>
+        </p:spPr>
+        <p:style>
+          <a:lnRef idx="2">
+            <a:schemeClr val="accent1">
+              <a:shade val="50000"/>
+            </a:schemeClr>
+          </a:lnRef>
+          <a:fillRef idx="1">
+            <a:schemeClr val="accent1"/>
+          </a:fillRef>
+          <a:effectRef idx="0">
+            <a:schemeClr val="accent1"/>
+          </a:effectRef>
+          <a:fontRef idx="minor">
+            <a:schemeClr val="lt1"/>
+          </a:fontRef>
+        </p:style>
+        <p:txBody>
+          <a:bodyPr rtlCol="0" anchor="ctr"/>
+          <a:lstStyle/>
+          <a:p>
+            <a:pPr algn="ctr"/>
+            <a:r>
+              <a:rPr lang="en-US" sz="1100" u="sng" dirty="0">
+                <a:solidFill>
+                  <a:schemeClr val="tx1"/>
+                </a:solidFill>
+              </a:rPr>
+              <a:t>id</a:t>
+            </a:r>
+          </a:p>
+        </p:txBody>
+      </p:sp>
+      <p:cxnSp>
+        <p:nvCxnSpPr>
+          <p:cNvPr id="80" name="直接连接符 79">
+            <a:extLst>
+              <a:ext uri="{FF2B5EF4-FFF2-40B4-BE49-F238E27FC236}">
+                <a16:creationId xmlns:a16="http://schemas.microsoft.com/office/drawing/2014/main" id="{DD8DD645-53A2-4C1E-9EEA-BDD5FA152983}"/>
+              </a:ext>
+            </a:extLst>
+          </p:cNvPr>
+          <p:cNvCxnSpPr>
+            <a:stCxn id="116" idx="2"/>
+            <a:endCxn id="53" idx="0"/>
+          </p:cNvCxnSpPr>
+          <p:nvPr/>
+        </p:nvCxnSpPr>
+        <p:spPr>
+          <a:xfrm flipH="1">
+            <a:off x="2801006" y="1255975"/>
+            <a:ext cx="688429" cy="119170"/>
+          </a:xfrm>
+          <a:prstGeom prst="line">
+            <a:avLst/>
+          </a:prstGeom>
+        </p:spPr>
+        <p:style>
+          <a:lnRef idx="1">
+            <a:schemeClr val="accent4"/>
+          </a:lnRef>
+          <a:fillRef idx="0">
+            <a:schemeClr val="accent4"/>
+          </a:fillRef>
+          <a:effectRef idx="0">
+            <a:schemeClr val="accent4"/>
+          </a:effectRef>
+          <a:fontRef idx="minor">
+            <a:schemeClr val="tx1"/>
+          </a:fontRef>
+        </p:style>
+      </p:cxnSp>
+      <p:sp>
+        <p:nvSpPr>
+          <p:cNvPr id="127" name="Oval 89">
+            <a:extLst>
+              <a:ext uri="{FF2B5EF4-FFF2-40B4-BE49-F238E27FC236}">
+                <a16:creationId xmlns:a16="http://schemas.microsoft.com/office/drawing/2014/main" id="{405ED69D-4044-4A4D-92AA-C6840BF0C3C5}"/>
+              </a:ext>
+            </a:extLst>
+          </p:cNvPr>
+          <p:cNvSpPr/>
+          <p:nvPr/>
+        </p:nvSpPr>
+        <p:spPr>
+          <a:xfrm>
+            <a:off x="5166209" y="6265449"/>
+            <a:ext cx="1376857" cy="283779"/>
+          </a:xfrm>
+          <a:prstGeom prst="ellipse">
+            <a:avLst/>
+          </a:prstGeom>
+        </p:spPr>
+        <p:style>
+          <a:lnRef idx="2">
+            <a:schemeClr val="accent1">
+              <a:shade val="50000"/>
+            </a:schemeClr>
+          </a:lnRef>
+          <a:fillRef idx="1">
+            <a:schemeClr val="accent1"/>
+          </a:fillRef>
+          <a:effectRef idx="0">
+            <a:schemeClr val="accent1"/>
+          </a:effectRef>
+          <a:fontRef idx="minor">
+            <a:schemeClr val="lt1"/>
+          </a:fontRef>
+        </p:style>
+        <p:txBody>
+          <a:bodyPr rtlCol="0" anchor="ctr"/>
+          <a:lstStyle/>
+          <a:p>
+            <a:pPr algn="ctr"/>
+            <a:r>
+              <a:rPr lang="en-US" sz="1100" u="sng" dirty="0">
+                <a:solidFill>
+                  <a:schemeClr val="tx1"/>
+                </a:solidFill>
+              </a:rPr>
+              <a:t>id</a:t>
+            </a:r>
+          </a:p>
+        </p:txBody>
+      </p:sp>
+      <p:cxnSp>
+        <p:nvCxnSpPr>
+          <p:cNvPr id="95" name="直接连接符 94">
+            <a:extLst>
+              <a:ext uri="{FF2B5EF4-FFF2-40B4-BE49-F238E27FC236}">
+                <a16:creationId xmlns:a16="http://schemas.microsoft.com/office/drawing/2014/main" id="{CEC00C12-2D27-49DF-9AB7-67F63628734B}"/>
+              </a:ext>
+            </a:extLst>
+          </p:cNvPr>
+          <p:cNvCxnSpPr>
+            <a:stCxn id="113" idx="2"/>
+            <a:endCxn id="127" idx="1"/>
+          </p:cNvCxnSpPr>
+          <p:nvPr/>
+        </p:nvCxnSpPr>
+        <p:spPr>
+          <a:xfrm flipH="1">
+            <a:off x="5367845" y="5923200"/>
+            <a:ext cx="591057" cy="383807"/>
+          </a:xfrm>
+          <a:prstGeom prst="line">
+            <a:avLst/>
+          </a:prstGeom>
+        </p:spPr>
+        <p:style>
+          <a:lnRef idx="1">
+            <a:schemeClr val="accent4"/>
+          </a:lnRef>
+          <a:fillRef idx="0">
+            <a:schemeClr val="accent4"/>
+          </a:fillRef>
+          <a:effectRef idx="0">
+            <a:schemeClr val="accent4"/>
+          </a:effectRef>
+          <a:fontRef idx="minor">
+            <a:schemeClr val="tx1"/>
+          </a:fontRef>
+        </p:style>
+      </p:cxnSp>
+      <p:sp>
+        <p:nvSpPr>
+          <p:cNvPr id="130" name="Oval 89">
+            <a:extLst>
+              <a:ext uri="{FF2B5EF4-FFF2-40B4-BE49-F238E27FC236}">
+                <a16:creationId xmlns:a16="http://schemas.microsoft.com/office/drawing/2014/main" id="{909D828A-6296-4B42-8A83-4E4E7190E498}"/>
+              </a:ext>
+            </a:extLst>
+          </p:cNvPr>
+          <p:cNvSpPr/>
+          <p:nvPr/>
+        </p:nvSpPr>
+        <p:spPr>
+          <a:xfrm>
+            <a:off x="6608635" y="6287114"/>
+            <a:ext cx="1376857" cy="283779"/>
+          </a:xfrm>
+          <a:prstGeom prst="ellipse">
+            <a:avLst/>
+          </a:prstGeom>
+        </p:spPr>
+        <p:style>
+          <a:lnRef idx="2">
+            <a:schemeClr val="accent1">
+              <a:shade val="50000"/>
+            </a:schemeClr>
+          </a:lnRef>
+          <a:fillRef idx="1">
+            <a:schemeClr val="accent1"/>
+          </a:fillRef>
+          <a:effectRef idx="0">
+            <a:schemeClr val="accent1"/>
+          </a:effectRef>
+          <a:fontRef idx="minor">
+            <a:schemeClr val="lt1"/>
+          </a:fontRef>
+        </p:style>
+        <p:txBody>
+          <a:bodyPr rtlCol="0" anchor="ctr"/>
+          <a:lstStyle/>
+          <a:p>
+            <a:pPr algn="ctr"/>
+            <a:r>
+              <a:rPr lang="en-US" sz="1100" dirty="0">
+                <a:solidFill>
+                  <a:schemeClr val="tx1"/>
+                </a:solidFill>
+              </a:rPr>
+              <a:t>Name</a:t>
+            </a:r>
+          </a:p>
+        </p:txBody>
+      </p:sp>
+      <p:cxnSp>
+        <p:nvCxnSpPr>
+          <p:cNvPr id="97" name="直接连接符 96">
+            <a:extLst>
+              <a:ext uri="{FF2B5EF4-FFF2-40B4-BE49-F238E27FC236}">
+                <a16:creationId xmlns:a16="http://schemas.microsoft.com/office/drawing/2014/main" id="{9F4882C0-F624-4C8A-A9F9-C75A5670269F}"/>
+              </a:ext>
+            </a:extLst>
+          </p:cNvPr>
+          <p:cNvCxnSpPr>
+            <a:stCxn id="130" idx="0"/>
+            <a:endCxn id="113" idx="2"/>
+          </p:cNvCxnSpPr>
+          <p:nvPr/>
+        </p:nvCxnSpPr>
+        <p:spPr>
+          <a:xfrm flipH="1" flipV="1">
+            <a:off x="5958902" y="5923200"/>
+            <a:ext cx="1338162" cy="363914"/>
+          </a:xfrm>
+          <a:prstGeom prst="line">
+            <a:avLst/>
+          </a:prstGeom>
+        </p:spPr>
+        <p:style>
+          <a:lnRef idx="1">
+            <a:schemeClr val="accent5"/>
+          </a:lnRef>
+          <a:fillRef idx="0">
+            <a:schemeClr val="accent5"/>
+          </a:fillRef>
+          <a:effectRef idx="0">
+            <a:schemeClr val="accent5"/>
           </a:effectRef>
           <a:fontRef idx="minor">
             <a:schemeClr val="tx1"/>

</xml_diff>

<commit_message>
update the diagram and db document
</commit_message>
<xml_diff>
--- a/documents/diagram.pptx
+++ b/documents/diagram.pptx
@@ -219,7 +219,7 @@
           <a:p>
             <a:fld id="{6E54921F-DD3B-43A5-901A-D573FBFBBEC0}" type="datetimeFigureOut">
               <a:rPr lang="en-US" smtClean="0"/>
-              <a:t>5/29/2018</a:t>
+              <a:t>5/30/2018</a:t>
             </a:fld>
             <a:endParaRPr lang="en-US"/>
           </a:p>
@@ -461,7 +461,7 @@
           <a:p>
             <a:fld id="{7AF6CCF6-E8EE-464C-BF2C-15F895051F3B}" type="datetimeFigureOut">
               <a:rPr lang="en-US" smtClean="0"/>
-              <a:t>5/29/2018</a:t>
+              <a:t>5/30/2018</a:t>
             </a:fld>
             <a:endParaRPr lang="en-US"/>
           </a:p>
@@ -659,7 +659,7 @@
           <a:p>
             <a:fld id="{7AF6CCF6-E8EE-464C-BF2C-15F895051F3B}" type="datetimeFigureOut">
               <a:rPr lang="en-US" smtClean="0"/>
-              <a:t>5/29/2018</a:t>
+              <a:t>5/30/2018</a:t>
             </a:fld>
             <a:endParaRPr lang="en-US"/>
           </a:p>
@@ -867,7 +867,7 @@
           <a:p>
             <a:fld id="{7AF6CCF6-E8EE-464C-BF2C-15F895051F3B}" type="datetimeFigureOut">
               <a:rPr lang="en-US" smtClean="0"/>
-              <a:t>5/29/2018</a:t>
+              <a:t>5/30/2018</a:t>
             </a:fld>
             <a:endParaRPr lang="en-US"/>
           </a:p>
@@ -1065,7 +1065,7 @@
           <a:p>
             <a:fld id="{7AF6CCF6-E8EE-464C-BF2C-15F895051F3B}" type="datetimeFigureOut">
               <a:rPr lang="en-US" smtClean="0"/>
-              <a:t>5/29/2018</a:t>
+              <a:t>5/30/2018</a:t>
             </a:fld>
             <a:endParaRPr lang="en-US"/>
           </a:p>
@@ -1340,7 +1340,7 @@
           <a:p>
             <a:fld id="{7AF6CCF6-E8EE-464C-BF2C-15F895051F3B}" type="datetimeFigureOut">
               <a:rPr lang="en-US" smtClean="0"/>
-              <a:t>5/29/2018</a:t>
+              <a:t>5/30/2018</a:t>
             </a:fld>
             <a:endParaRPr lang="en-US"/>
           </a:p>
@@ -1605,7 +1605,7 @@
           <a:p>
             <a:fld id="{7AF6CCF6-E8EE-464C-BF2C-15F895051F3B}" type="datetimeFigureOut">
               <a:rPr lang="en-US" smtClean="0"/>
-              <a:t>5/29/2018</a:t>
+              <a:t>5/30/2018</a:t>
             </a:fld>
             <a:endParaRPr lang="en-US"/>
           </a:p>
@@ -2017,7 +2017,7 @@
           <a:p>
             <a:fld id="{7AF6CCF6-E8EE-464C-BF2C-15F895051F3B}" type="datetimeFigureOut">
               <a:rPr lang="en-US" smtClean="0"/>
-              <a:t>5/29/2018</a:t>
+              <a:t>5/30/2018</a:t>
             </a:fld>
             <a:endParaRPr lang="en-US"/>
           </a:p>
@@ -2158,7 +2158,7 @@
           <a:p>
             <a:fld id="{7AF6CCF6-E8EE-464C-BF2C-15F895051F3B}" type="datetimeFigureOut">
               <a:rPr lang="en-US" smtClean="0"/>
-              <a:t>5/29/2018</a:t>
+              <a:t>5/30/2018</a:t>
             </a:fld>
             <a:endParaRPr lang="en-US"/>
           </a:p>
@@ -2271,7 +2271,7 @@
           <a:p>
             <a:fld id="{7AF6CCF6-E8EE-464C-BF2C-15F895051F3B}" type="datetimeFigureOut">
               <a:rPr lang="en-US" smtClean="0"/>
-              <a:t>5/29/2018</a:t>
+              <a:t>5/30/2018</a:t>
             </a:fld>
             <a:endParaRPr lang="en-US"/>
           </a:p>
@@ -2582,7 +2582,7 @@
           <a:p>
             <a:fld id="{7AF6CCF6-E8EE-464C-BF2C-15F895051F3B}" type="datetimeFigureOut">
               <a:rPr lang="en-US" smtClean="0"/>
-              <a:t>5/29/2018</a:t>
+              <a:t>5/30/2018</a:t>
             </a:fld>
             <a:endParaRPr lang="en-US"/>
           </a:p>
@@ -2870,7 +2870,7 @@
           <a:p>
             <a:fld id="{7AF6CCF6-E8EE-464C-BF2C-15F895051F3B}" type="datetimeFigureOut">
               <a:rPr lang="en-US" smtClean="0"/>
-              <a:t>5/29/2018</a:t>
+              <a:t>5/30/2018</a:t>
             </a:fld>
             <a:endParaRPr lang="en-US"/>
           </a:p>
@@ -3111,7 +3111,7 @@
           <a:p>
             <a:fld id="{7AF6CCF6-E8EE-464C-BF2C-15F895051F3B}" type="datetimeFigureOut">
               <a:rPr lang="en-US" smtClean="0"/>
-              <a:t>5/29/2018</a:t>
+              <a:t>5/30/2018</a:t>
             </a:fld>
             <a:endParaRPr lang="en-US"/>
           </a:p>
@@ -3546,8 +3546,8 @@
         </p:nvCxnSpPr>
         <p:spPr>
           <a:xfrm>
-            <a:off x="6609615" y="4871620"/>
-            <a:ext cx="429637" cy="1416616"/>
+            <a:off x="6417611" y="5324269"/>
+            <a:ext cx="621641" cy="963967"/>
           </a:xfrm>
           <a:prstGeom prst="line">
             <a:avLst/>
@@ -3590,8 +3590,8 @@
         </p:nvCxnSpPr>
         <p:spPr>
           <a:xfrm flipH="1">
-            <a:off x="5867031" y="4871620"/>
-            <a:ext cx="742584" cy="1346526"/>
+            <a:off x="5867031" y="5324269"/>
+            <a:ext cx="550580" cy="893877"/>
           </a:xfrm>
           <a:prstGeom prst="line">
             <a:avLst/>
@@ -4827,59 +4827,6 @@
           </a:fontRef>
         </p:style>
       </p:cxnSp>
-      <p:sp>
-        <p:nvSpPr>
-          <p:cNvPr id="53" name="Diamond 52">
-            <a:extLst>
-              <a:ext uri="{FF2B5EF4-FFF2-40B4-BE49-F238E27FC236}">
-                <a16:creationId xmlns:a16="http://schemas.microsoft.com/office/drawing/2014/main" id="{009C787D-D8C2-474E-9643-DFE691B407ED}"/>
-              </a:ext>
-            </a:extLst>
-          </p:cNvPr>
-          <p:cNvSpPr/>
-          <p:nvPr/>
-        </p:nvSpPr>
-        <p:spPr>
-          <a:xfrm>
-            <a:off x="2039005" y="1375145"/>
-            <a:ext cx="1524002" cy="556681"/>
-          </a:xfrm>
-          <a:prstGeom prst="diamond">
-            <a:avLst/>
-          </a:prstGeom>
-        </p:spPr>
-        <p:style>
-          <a:lnRef idx="2">
-            <a:schemeClr val="accent1">
-              <a:shade val="50000"/>
-            </a:schemeClr>
-          </a:lnRef>
-          <a:fillRef idx="1">
-            <a:schemeClr val="accent1"/>
-          </a:fillRef>
-          <a:effectRef idx="0">
-            <a:schemeClr val="accent1"/>
-          </a:effectRef>
-          <a:fontRef idx="minor">
-            <a:schemeClr val="lt1"/>
-          </a:fontRef>
-        </p:style>
-        <p:txBody>
-          <a:bodyPr rtlCol="0" anchor="ctr"/>
-          <a:lstStyle/>
-          <a:p>
-            <a:pPr algn="ctr"/>
-            <a:r>
-              <a:rPr lang="en-US" sz="1050" dirty="0">
-                <a:solidFill>
-                  <a:schemeClr val="tx1"/>
-                </a:solidFill>
-              </a:rPr>
-              <a:t>appoint</a:t>
-            </a:r>
-          </a:p>
-        </p:txBody>
-      </p:sp>
       <p:cxnSp>
         <p:nvCxnSpPr>
           <p:cNvPr id="55" name="Straight Connector 54">
@@ -5099,6 +5046,7 @@
             </a:extLst>
           </p:cNvPr>
           <p:cNvCxnSpPr>
+            <a:cxnSpLocks/>
             <a:stCxn id="64" idx="4"/>
             <a:endCxn id="53" idx="0"/>
           </p:cNvCxnSpPr>
@@ -5147,7 +5095,7 @@
         </p:nvSpPr>
         <p:spPr>
           <a:xfrm>
-            <a:off x="4615088" y="2712029"/>
+            <a:off x="4852456" y="2826279"/>
             <a:ext cx="1802523" cy="472965"/>
           </a:xfrm>
           <a:prstGeom prst="rect">
@@ -5261,8 +5209,8 @@
         </p:nvCxnSpPr>
         <p:spPr>
           <a:xfrm>
-            <a:off x="5516350" y="3184994"/>
-            <a:ext cx="1344608" cy="402147"/>
+            <a:off x="5753718" y="3299244"/>
+            <a:ext cx="1107240" cy="287897"/>
           </a:xfrm>
           <a:prstGeom prst="line">
             <a:avLst/>
@@ -5302,7 +5250,7 @@
         </p:nvSpPr>
         <p:spPr>
           <a:xfrm>
-            <a:off x="4494723" y="1356774"/>
+            <a:off x="4043856" y="1870923"/>
             <a:ext cx="1524002" cy="556681"/>
           </a:xfrm>
           <a:prstGeom prst="diamond">
@@ -5359,8 +5307,8 @@
         </p:nvCxnSpPr>
         <p:spPr>
           <a:xfrm flipV="1">
-            <a:off x="3415860" y="1635115"/>
-            <a:ext cx="1078863" cy="1870078"/>
+            <a:off x="3415860" y="2149264"/>
+            <a:ext cx="627996" cy="1355929"/>
           </a:xfrm>
           <a:prstGeom prst="line">
             <a:avLst/>
@@ -5369,6 +5317,7 @@
             <a:solidFill>
               <a:schemeClr val="tx1"/>
             </a:solidFill>
+            <a:headEnd type="arrow"/>
           </a:ln>
         </p:spPr>
         <p:style>
@@ -5403,13 +5352,13 @@
         </p:nvCxnSpPr>
         <p:spPr>
           <a:xfrm>
-            <a:off x="5256724" y="1913455"/>
-            <a:ext cx="259626" cy="798574"/>
+            <a:off x="4805857" y="2427604"/>
+            <a:ext cx="947861" cy="398675"/>
           </a:xfrm>
           <a:prstGeom prst="line">
             <a:avLst/>
           </a:prstGeom>
-          <a:ln>
+          <a:ln w="57150" cmpd="dbl">
             <a:solidFill>
               <a:schemeClr val="tx1"/>
             </a:solidFill>
@@ -5430,76 +5379,6 @@
           </a:fontRef>
         </p:style>
       </p:cxnSp>
-      <p:sp>
-        <p:nvSpPr>
-          <p:cNvPr id="105" name="TextBox 104">
-            <a:extLst>
-              <a:ext uri="{FF2B5EF4-FFF2-40B4-BE49-F238E27FC236}">
-                <a16:creationId xmlns:a16="http://schemas.microsoft.com/office/drawing/2014/main" id="{2B23E377-B0E7-4020-B433-272AB48457E0}"/>
-              </a:ext>
-            </a:extLst>
-          </p:cNvPr>
-          <p:cNvSpPr txBox="1"/>
-          <p:nvPr/>
-        </p:nvSpPr>
-        <p:spPr>
-          <a:xfrm>
-            <a:off x="3719602" y="2766701"/>
-            <a:ext cx="269626" cy="276999"/>
-          </a:xfrm>
-          <a:prstGeom prst="rect">
-            <a:avLst/>
-          </a:prstGeom>
-          <a:noFill/>
-        </p:spPr>
-        <p:txBody>
-          <a:bodyPr wrap="none" rtlCol="0">
-            <a:spAutoFit/>
-          </a:bodyPr>
-          <a:lstStyle/>
-          <a:p>
-            <a:r>
-              <a:rPr lang="en-US" sz="1200" dirty="0"/>
-              <a:t>1</a:t>
-            </a:r>
-          </a:p>
-        </p:txBody>
-      </p:sp>
-      <p:sp>
-        <p:nvSpPr>
-          <p:cNvPr id="106" name="TextBox 105">
-            <a:extLst>
-              <a:ext uri="{FF2B5EF4-FFF2-40B4-BE49-F238E27FC236}">
-                <a16:creationId xmlns:a16="http://schemas.microsoft.com/office/drawing/2014/main" id="{B31AEECF-2E13-444A-A4E3-08F69AE0C9A6}"/>
-              </a:ext>
-            </a:extLst>
-          </p:cNvPr>
-          <p:cNvSpPr txBox="1"/>
-          <p:nvPr/>
-        </p:nvSpPr>
-        <p:spPr>
-          <a:xfrm>
-            <a:off x="5133783" y="2310881"/>
-            <a:ext cx="269626" cy="276999"/>
-          </a:xfrm>
-          <a:prstGeom prst="rect">
-            <a:avLst/>
-          </a:prstGeom>
-          <a:noFill/>
-        </p:spPr>
-        <p:txBody>
-          <a:bodyPr wrap="none" rtlCol="0">
-            <a:spAutoFit/>
-          </a:bodyPr>
-          <a:lstStyle/>
-          <a:p>
-            <a:r>
-              <a:rPr lang="en-US" sz="1200" dirty="0"/>
-              <a:t>1</a:t>
-            </a:r>
-          </a:p>
-        </p:txBody>
-      </p:sp>
       <p:sp>
         <p:nvSpPr>
           <p:cNvPr id="109" name="Diamond 108">
@@ -5778,7 +5657,7 @@
         </p:nvSpPr>
         <p:spPr>
           <a:xfrm>
-            <a:off x="3592676" y="3978158"/>
+            <a:off x="3503299" y="3919284"/>
             <a:ext cx="1524002" cy="556681"/>
           </a:xfrm>
           <a:prstGeom prst="diamond">
@@ -5836,7 +5715,7 @@
         </p:nvSpPr>
         <p:spPr>
           <a:xfrm>
-            <a:off x="5921186" y="4398655"/>
+            <a:off x="5729182" y="4851304"/>
             <a:ext cx="1376858" cy="472965"/>
           </a:xfrm>
           <a:prstGeom prst="rect">
@@ -6110,8 +5989,8 @@
         </p:nvCxnSpPr>
         <p:spPr>
           <a:xfrm flipH="1">
-            <a:off x="5837029" y="4871620"/>
-            <a:ext cx="772586" cy="919566"/>
+            <a:off x="5837029" y="5324269"/>
+            <a:ext cx="580582" cy="466917"/>
           </a:xfrm>
           <a:prstGeom prst="line">
             <a:avLst/>
@@ -6155,8 +6034,8 @@
         </p:nvCxnSpPr>
         <p:spPr>
           <a:xfrm>
-            <a:off x="6609615" y="4871620"/>
-            <a:ext cx="756859" cy="1023186"/>
+            <a:off x="6417611" y="5324269"/>
+            <a:ext cx="948863" cy="570537"/>
           </a:xfrm>
           <a:prstGeom prst="line">
             <a:avLst/>
@@ -6198,9 +6077,9 @@
           <p:nvPr/>
         </p:nvCxnSpPr>
         <p:spPr>
-          <a:xfrm flipV="1">
-            <a:off x="4354677" y="4398655"/>
-            <a:ext cx="2254938" cy="136184"/>
+          <a:xfrm>
+            <a:off x="4265300" y="4475965"/>
+            <a:ext cx="2152311" cy="375339"/>
           </a:xfrm>
           <a:prstGeom prst="line">
             <a:avLst/>
@@ -6240,7 +6119,7 @@
         </p:nvSpPr>
         <p:spPr>
           <a:xfrm>
-            <a:off x="7017693" y="2567831"/>
+            <a:off x="7124764" y="2612293"/>
             <a:ext cx="1524002" cy="556681"/>
           </a:xfrm>
           <a:prstGeom prst="diamond">
@@ -6395,8 +6274,8 @@
         </p:nvCxnSpPr>
         <p:spPr>
           <a:xfrm flipH="1">
-            <a:off x="6417611" y="2846172"/>
-            <a:ext cx="600082" cy="102340"/>
+            <a:off x="6654979" y="2890634"/>
+            <a:ext cx="469785" cy="172128"/>
           </a:xfrm>
           <a:prstGeom prst="line">
             <a:avLst/>
@@ -6638,8 +6517,8 @@
         </p:nvCxnSpPr>
         <p:spPr>
           <a:xfrm flipV="1">
-            <a:off x="5393809" y="3184994"/>
-            <a:ext cx="122541" cy="414251"/>
+            <a:off x="5393809" y="3299244"/>
+            <a:ext cx="359909" cy="300001"/>
           </a:xfrm>
           <a:prstGeom prst="line">
             <a:avLst/>
@@ -6677,9 +6556,9 @@
           <p:nvPr/>
         </p:nvCxnSpPr>
         <p:spPr>
-          <a:xfrm flipV="1">
-            <a:off x="6532140" y="4871620"/>
-            <a:ext cx="77475" cy="1658837"/>
+          <a:xfrm flipH="1" flipV="1">
+            <a:off x="6417611" y="5324269"/>
+            <a:ext cx="114529" cy="1206188"/>
           </a:xfrm>
           <a:prstGeom prst="line">
             <a:avLst/>
@@ -6849,12 +6728,20 @@
           <a:p>
             <a:pPr algn="ctr"/>
             <a:r>
+              <a:rPr lang="en-US" altLang="zh-CN" sz="1100" dirty="0">
+                <a:solidFill>
+                  <a:schemeClr val="tx1"/>
+                </a:solidFill>
+              </a:rPr>
+              <a:t>n</a:t>
+            </a:r>
+            <a:r>
               <a:rPr lang="en-US" sz="1100" dirty="0">
                 <a:solidFill>
                   <a:schemeClr val="tx1"/>
                 </a:solidFill>
               </a:rPr>
-              <a:t>Name</a:t>
+              <a:t>ame</a:t>
             </a:r>
           </a:p>
         </p:txBody>
@@ -6908,6 +6795,7 @@
             </a:extLst>
           </p:cNvPr>
           <p:cNvCxnSpPr>
+            <a:cxnSpLocks/>
             <a:stCxn id="116" idx="4"/>
             <a:endCxn id="53" idx="0"/>
           </p:cNvCxnSpPr>
@@ -6959,8 +6847,8 @@
         </p:nvCxnSpPr>
         <p:spPr>
           <a:xfrm flipV="1">
-            <a:off x="8541695" y="2772405"/>
-            <a:ext cx="636076" cy="73767"/>
+            <a:off x="8648766" y="2772405"/>
+            <a:ext cx="529005" cy="118229"/>
           </a:xfrm>
           <a:prstGeom prst="line">
             <a:avLst/>
@@ -7037,8 +6925,8 @@
         </p:nvCxnSpPr>
         <p:spPr>
           <a:xfrm flipH="1">
-            <a:off x="4354677" y="2948512"/>
-            <a:ext cx="260411" cy="1029646"/>
+            <a:off x="4265300" y="3062762"/>
+            <a:ext cx="587156" cy="856522"/>
           </a:xfrm>
           <a:prstGeom prst="line">
             <a:avLst/>
@@ -7135,8 +7023,8 @@
         </p:nvCxnSpPr>
         <p:spPr>
           <a:xfrm>
-            <a:off x="6609615" y="4871620"/>
-            <a:ext cx="1771746" cy="586876"/>
+            <a:off x="6417611" y="5324269"/>
+            <a:ext cx="1963750" cy="134227"/>
           </a:xfrm>
           <a:prstGeom prst="line">
             <a:avLst/>
@@ -7268,7 +7156,7 @@
         </p:nvSpPr>
         <p:spPr>
           <a:xfrm>
-            <a:off x="5594728" y="1962445"/>
+            <a:off x="6055376" y="1894017"/>
             <a:ext cx="2029774" cy="283779"/>
           </a:xfrm>
           <a:prstGeom prst="ellipse">
@@ -7329,8 +7217,8 @@
         </p:nvCxnSpPr>
         <p:spPr>
           <a:xfrm flipH="1">
-            <a:off x="5516350" y="2246224"/>
-            <a:ext cx="1093265" cy="465805"/>
+            <a:off x="5753718" y="2177796"/>
+            <a:ext cx="1316545" cy="648483"/>
           </a:xfrm>
           <a:prstGeom prst="line">
             <a:avLst/>
@@ -7467,6 +7355,7 @@
             </a:extLst>
           </p:cNvPr>
           <p:cNvCxnSpPr>
+            <a:cxnSpLocks/>
             <a:stCxn id="190" idx="4"/>
             <a:endCxn id="53" idx="0"/>
           </p:cNvCxnSpPr>
@@ -7506,6 +7395,7 @@
             </a:extLst>
           </p:cNvPr>
           <p:cNvCxnSpPr>
+            <a:cxnSpLocks/>
             <a:stCxn id="195" idx="4"/>
             <a:endCxn id="53" idx="0"/>
           </p:cNvCxnSpPr>
@@ -7535,6 +7425,72 @@
           </a:fontRef>
         </p:style>
       </p:cxnSp>
+      <p:sp>
+        <p:nvSpPr>
+          <p:cNvPr id="53" name="Diamond 52">
+            <a:extLst>
+              <a:ext uri="{FF2B5EF4-FFF2-40B4-BE49-F238E27FC236}">
+                <a16:creationId xmlns:a16="http://schemas.microsoft.com/office/drawing/2014/main" id="{009C787D-D8C2-474E-9643-DFE691B407ED}"/>
+              </a:ext>
+            </a:extLst>
+          </p:cNvPr>
+          <p:cNvSpPr/>
+          <p:nvPr/>
+        </p:nvSpPr>
+        <p:spPr>
+          <a:xfrm>
+            <a:off x="1746349" y="1375145"/>
+            <a:ext cx="2109314" cy="556681"/>
+          </a:xfrm>
+          <a:prstGeom prst="diamond">
+            <a:avLst/>
+          </a:prstGeom>
+        </p:spPr>
+        <p:style>
+          <a:lnRef idx="2">
+            <a:schemeClr val="accent1">
+              <a:shade val="50000"/>
+            </a:schemeClr>
+          </a:lnRef>
+          <a:fillRef idx="1">
+            <a:schemeClr val="accent1"/>
+          </a:fillRef>
+          <a:effectRef idx="0">
+            <a:schemeClr val="accent1"/>
+          </a:effectRef>
+          <a:fontRef idx="minor">
+            <a:schemeClr val="lt1"/>
+          </a:fontRef>
+        </p:style>
+        <p:txBody>
+          <a:bodyPr rtlCol="0" anchor="ctr"/>
+          <a:lstStyle/>
+          <a:p>
+            <a:pPr algn="ctr"/>
+            <a:r>
+              <a:rPr lang="en-US" sz="1050" dirty="0">
+                <a:solidFill>
+                  <a:schemeClr val="tx1"/>
+                </a:solidFill>
+              </a:rPr>
+              <a:t>appoint</a:t>
+            </a:r>
+            <a:r>
+              <a:rPr lang="en-US" altLang="zh-CN" sz="1050" dirty="0">
+                <a:solidFill>
+                  <a:schemeClr val="tx1"/>
+                </a:solidFill>
+              </a:rPr>
+              <a:t>ment</a:t>
+            </a:r>
+            <a:endParaRPr lang="en-US" sz="1050" dirty="0">
+              <a:solidFill>
+                <a:schemeClr val="tx1"/>
+              </a:solidFill>
+            </a:endParaRPr>
+          </a:p>
+        </p:txBody>
+      </p:sp>
     </p:spTree>
     <p:extLst>
       <p:ext uri="{BB962C8B-B14F-4D97-AF65-F5344CB8AC3E}">

</xml_diff>